<commit_message>
Màj de quelques polices dans la présentation.
</commit_message>
<xml_diff>
--- a/Présentation finale/presentation_finale.pptx
+++ b/Présentation finale/presentation_finale.pptx
@@ -6654,7 +6654,7 @@
           <a:lstStyle/>
           <a:p>
             <a:r>
-              <a:rPr lang="fr-FR" b="0" strike="noStrike" spc="-1" dirty="0">
+              <a:rPr lang="fr-FR" b="0" i="1" strike="noStrike" spc="-1" dirty="0">
                 <a:solidFill>
                   <a:srgbClr val="000000"/>
                 </a:solidFill>
@@ -6663,6 +6663,7 @@
                     <a:srgbClr val="FFFFFF"/>
                   </a:solidFill>
                 </a:uFill>
+                <a:latin typeface="Eurostile" panose="020B0504020202050204" pitchFamily="34" charset="0"/>
               </a:rPr>
               <a:t>Le chat est couché</a:t>
             </a:r>
@@ -6727,7 +6728,7 @@
           <a:lstStyle/>
           <a:p>
             <a:r>
-              <a:rPr lang="fr-FR" b="0" strike="noStrike" spc="-1" dirty="0">
+              <a:rPr lang="fr-FR" b="0" i="1" strike="noStrike" spc="-1" dirty="0">
                 <a:solidFill>
                   <a:srgbClr val="000000"/>
                 </a:solidFill>
@@ -6736,13 +6737,14 @@
                     <a:srgbClr val="FFFFFF"/>
                   </a:solidFill>
                 </a:uFill>
+                <a:latin typeface="Eurostile" panose="020B0504020202050204" pitchFamily="34" charset="0"/>
               </a:rPr>
               <a:t>[le]</a:t>
             </a:r>
           </a:p>
           <a:p>
             <a:r>
-              <a:rPr lang="fr-FR" b="0" strike="noStrike" spc="-1" dirty="0">
+              <a:rPr lang="fr-FR" b="0" i="1" strike="noStrike" spc="-1" dirty="0">
                 <a:solidFill>
                   <a:srgbClr val="000000"/>
                 </a:solidFill>
@@ -6751,13 +6753,14 @@
                     <a:srgbClr val="FFFFFF"/>
                   </a:solidFill>
                 </a:uFill>
+                <a:latin typeface="Eurostile" panose="020B0504020202050204" pitchFamily="34" charset="0"/>
               </a:rPr>
               <a:t>[chat]</a:t>
             </a:r>
           </a:p>
           <a:p>
             <a:r>
-              <a:rPr lang="fr-FR" b="0" strike="noStrike" spc="-1" dirty="0">
+              <a:rPr lang="fr-FR" b="0" i="1" strike="noStrike" spc="-1" dirty="0">
                 <a:solidFill>
                   <a:srgbClr val="000000"/>
                 </a:solidFill>
@@ -6766,13 +6769,14 @@
                     <a:srgbClr val="FFFFFF"/>
                   </a:solidFill>
                 </a:uFill>
+                <a:latin typeface="Eurostile" panose="020B0504020202050204" pitchFamily="34" charset="0"/>
               </a:rPr>
               <a:t>[est]</a:t>
             </a:r>
           </a:p>
           <a:p>
             <a:r>
-              <a:rPr lang="fr-FR" b="0" strike="noStrike" spc="-1" dirty="0">
+              <a:rPr lang="fr-FR" b="0" i="1" strike="noStrike" spc="-1" dirty="0">
                 <a:solidFill>
                   <a:srgbClr val="000000"/>
                 </a:solidFill>
@@ -6781,6 +6785,7 @@
                     <a:srgbClr val="FFFFFF"/>
                   </a:solidFill>
                 </a:uFill>
+                <a:latin typeface="Eurostile" panose="020B0504020202050204" pitchFamily="34" charset="0"/>
               </a:rPr>
               <a:t>[couché]</a:t>
             </a:r>
@@ -6845,7 +6850,7 @@
           <a:lstStyle/>
           <a:p>
             <a:r>
-              <a:rPr lang="fr-FR" b="0" strike="noStrike" spc="-1" dirty="0">
+              <a:rPr lang="fr-FR" b="0" i="1" strike="noStrike" spc="-1" dirty="0">
                 <a:solidFill>
                   <a:srgbClr val="000000"/>
                 </a:solidFill>
@@ -6854,13 +6859,14 @@
                     <a:srgbClr val="FFFFFF"/>
                   </a:solidFill>
                 </a:uFill>
+                <a:latin typeface="Eurostile" panose="020B0504020202050204" pitchFamily="34" charset="0"/>
               </a:rPr>
               <a:t>(1, 0, 0, 0)</a:t>
             </a:r>
           </a:p>
           <a:p>
             <a:r>
-              <a:rPr lang="fr-FR" b="0" strike="noStrike" spc="-1" dirty="0">
+              <a:rPr lang="fr-FR" b="0" i="1" strike="noStrike" spc="-1" dirty="0">
                 <a:solidFill>
                   <a:srgbClr val="000000"/>
                 </a:solidFill>
@@ -6869,13 +6875,14 @@
                     <a:srgbClr val="FFFFFF"/>
                   </a:solidFill>
                 </a:uFill>
+                <a:latin typeface="Eurostile" panose="020B0504020202050204" pitchFamily="34" charset="0"/>
               </a:rPr>
               <a:t>(0, 1, 0, 0)</a:t>
             </a:r>
           </a:p>
           <a:p>
             <a:r>
-              <a:rPr lang="fr-FR" b="0" strike="noStrike" spc="-1" dirty="0">
+              <a:rPr lang="fr-FR" b="0" i="1" strike="noStrike" spc="-1" dirty="0">
                 <a:solidFill>
                   <a:srgbClr val="000000"/>
                 </a:solidFill>
@@ -6884,13 +6891,14 @@
                     <a:srgbClr val="FFFFFF"/>
                   </a:solidFill>
                 </a:uFill>
+                <a:latin typeface="Eurostile" panose="020B0504020202050204" pitchFamily="34" charset="0"/>
               </a:rPr>
               <a:t>(0, 0, 1, 0)</a:t>
             </a:r>
           </a:p>
           <a:p>
             <a:r>
-              <a:rPr lang="fr-FR" b="0" strike="noStrike" spc="-1" dirty="0">
+              <a:rPr lang="fr-FR" b="0" i="1" strike="noStrike" spc="-1" dirty="0">
                 <a:solidFill>
                   <a:srgbClr val="000000"/>
                 </a:solidFill>
@@ -6899,6 +6907,7 @@
                     <a:srgbClr val="FFFFFF"/>
                   </a:solidFill>
                 </a:uFill>
+                <a:latin typeface="Eurostile" panose="020B0504020202050204" pitchFamily="34" charset="0"/>
               </a:rPr>
               <a:t>(0, 0, 0, 1)</a:t>
             </a:r>
@@ -6929,7 +6938,7 @@
           <a:lstStyle/>
           <a:p>
             <a:r>
-              <a:rPr lang="fr-FR" b="0" strike="noStrike" spc="-1" dirty="0">
+              <a:rPr lang="fr-FR" b="0" i="1" strike="noStrike" spc="-1" dirty="0">
                 <a:solidFill>
                   <a:srgbClr val="000000"/>
                 </a:solidFill>
@@ -6938,6 +6947,7 @@
                     <a:srgbClr val="FFFFFF"/>
                   </a:solidFill>
                 </a:uFill>
+                <a:latin typeface="Eurostile" panose="020B0504020202050204" pitchFamily="34" charset="0"/>
               </a:rPr>
               <a:t>Le chat est couché</a:t>
             </a:r>
@@ -6987,7 +6997,7 @@
         <p:spPr>
           <a:xfrm>
             <a:off x="4611240" y="4065660"/>
-            <a:ext cx="2251080" cy="937080"/>
+            <a:ext cx="2392364" cy="937080"/>
           </a:xfrm>
           <a:prstGeom prst="rect">
             <a:avLst/>
@@ -7002,7 +7012,7 @@
           <a:lstStyle/>
           <a:p>
             <a:r>
-              <a:rPr lang="fr-FR" b="0" strike="noStrike" spc="-1" dirty="0">
+              <a:rPr lang="fr-FR" b="0" i="1" strike="noStrike" spc="-1" dirty="0">
                 <a:solidFill>
                   <a:srgbClr val="000000"/>
                 </a:solidFill>
@@ -7011,13 +7021,14 @@
                     <a:srgbClr val="FFFFFF"/>
                   </a:solidFill>
                 </a:uFill>
+                <a:latin typeface="Eurostile" panose="020B0504020202050204" pitchFamily="34" charset="0"/>
               </a:rPr>
               <a:t>(0.23, -1.40, ..., 2.98)</a:t>
             </a:r>
           </a:p>
           <a:p>
             <a:r>
-              <a:rPr lang="fr-FR" b="0" strike="noStrike" spc="-1" dirty="0">
+              <a:rPr lang="fr-FR" b="0" i="1" strike="noStrike" spc="-1" dirty="0">
                 <a:solidFill>
                   <a:srgbClr val="000000"/>
                 </a:solidFill>
@@ -7026,13 +7037,14 @@
                     <a:srgbClr val="FFFFFF"/>
                   </a:solidFill>
                 </a:uFill>
+                <a:latin typeface="Eurostile" panose="020B0504020202050204" pitchFamily="34" charset="0"/>
               </a:rPr>
               <a:t>(0.02, 2.03, ..., -0.99)</a:t>
             </a:r>
           </a:p>
           <a:p>
             <a:r>
-              <a:rPr lang="fr-FR" b="0" strike="noStrike" spc="-1" dirty="0">
+              <a:rPr lang="fr-FR" b="0" i="1" strike="noStrike" spc="-1" dirty="0">
                 <a:solidFill>
                   <a:srgbClr val="000000"/>
                 </a:solidFill>
@@ -7041,13 +7053,14 @@
                     <a:srgbClr val="FFFFFF"/>
                   </a:solidFill>
                 </a:uFill>
+                <a:latin typeface="Eurostile" panose="020B0504020202050204" pitchFamily="34" charset="0"/>
               </a:rPr>
               <a:t>(-0.62, 0.56, ..., 0.67)</a:t>
             </a:r>
           </a:p>
           <a:p>
             <a:r>
-              <a:rPr lang="fr-FR" b="0" strike="noStrike" spc="-1" dirty="0">
+              <a:rPr lang="fr-FR" b="0" i="1" strike="noStrike" spc="-1" dirty="0">
                 <a:solidFill>
                   <a:srgbClr val="000000"/>
                 </a:solidFill>
@@ -7056,6 +7069,7 @@
                     <a:srgbClr val="FFFFFF"/>
                   </a:solidFill>
                 </a:uFill>
+                <a:latin typeface="Eurostile" panose="020B0504020202050204" pitchFamily="34" charset="0"/>
               </a:rPr>
               <a:t>(2.10, 0.04, ..., 0.868)</a:t>
             </a:r>
@@ -7071,7 +7085,7 @@
         <p:spPr>
           <a:xfrm>
             <a:off x="4755240" y="3993660"/>
-            <a:ext cx="1656000" cy="0"/>
+            <a:ext cx="1977000" cy="0"/>
           </a:xfrm>
           <a:prstGeom prst="line">
             <a:avLst/>
@@ -7107,7 +7121,7 @@
         </p:nvSpPr>
         <p:spPr>
           <a:xfrm>
-            <a:off x="4858319" y="3638172"/>
+            <a:off x="5002860" y="3638172"/>
             <a:ext cx="1481759" cy="355488"/>
           </a:xfrm>
           <a:prstGeom prst="rect">
@@ -7123,7 +7137,7 @@
           <a:lstStyle/>
           <a:p>
             <a:r>
-              <a:rPr lang="fr-FR" b="0" i="1" strike="noStrike" spc="-1" dirty="0">
+              <a:rPr lang="fr-FR" b="0" strike="noStrike" spc="-1" dirty="0">
                 <a:solidFill>
                   <a:schemeClr val="bg1">
                     <a:lumMod val="50000"/>
@@ -7164,7 +7178,7 @@
           <a:lstStyle/>
           <a:p>
             <a:r>
-              <a:rPr lang="fr-FR" b="0" i="1" strike="noStrike" spc="-1" dirty="0">
+              <a:rPr lang="fr-FR" b="0" strike="noStrike" spc="-1" dirty="0" smtClean="0">
                 <a:solidFill>
                   <a:schemeClr val="bg1">
                     <a:lumMod val="50000"/>
@@ -7176,8 +7190,20 @@
                   </a:solidFill>
                 </a:uFill>
               </a:rPr>
-              <a:t>optimisation</a:t>
-            </a:r>
+              <a:t>Optimisation</a:t>
+            </a:r>
+            <a:endParaRPr lang="fr-FR" b="0" strike="noStrike" spc="-1" dirty="0">
+              <a:solidFill>
+                <a:schemeClr val="bg1">
+                  <a:lumMod val="50000"/>
+                </a:schemeClr>
+              </a:solidFill>
+              <a:uFill>
+                <a:solidFill>
+                  <a:srgbClr val="FFFFFF"/>
+                </a:solidFill>
+              </a:uFill>
+            </a:endParaRPr>
           </a:p>
         </p:txBody>
       </p:sp>
@@ -7189,7 +7215,7 @@
         </p:nvSpPr>
         <p:spPr>
           <a:xfrm>
-            <a:off x="7003604" y="5157192"/>
+            <a:off x="6859099" y="5140805"/>
             <a:ext cx="2231640" cy="937080"/>
           </a:xfrm>
           <a:prstGeom prst="rect">
@@ -7205,7 +7231,7 @@
           <a:lstStyle/>
           <a:p>
             <a:r>
-              <a:rPr lang="fr-FR" b="0" strike="noStrike" spc="-1" dirty="0">
+              <a:rPr lang="fr-FR" b="0" i="1" strike="noStrike" spc="-1" dirty="0">
                 <a:solidFill>
                   <a:srgbClr val="000000"/>
                 </a:solidFill>
@@ -7214,13 +7240,14 @@
                     <a:srgbClr val="FFFFFF"/>
                   </a:solidFill>
                 </a:uFill>
+                <a:latin typeface="Eurostile" panose="020B0504020202050204" pitchFamily="34" charset="0"/>
               </a:rPr>
               <a:t>(2.2, 0.03, ..., 3.02)</a:t>
             </a:r>
           </a:p>
           <a:p>
             <a:r>
-              <a:rPr lang="fr-FR" b="0" strike="noStrike" spc="-1" dirty="0">
+              <a:rPr lang="fr-FR" b="0" i="1" strike="noStrike" spc="-1" dirty="0">
                 <a:solidFill>
                   <a:srgbClr val="000000"/>
                 </a:solidFill>
@@ -7229,13 +7256,14 @@
                     <a:srgbClr val="FFFFFF"/>
                   </a:solidFill>
                 </a:uFill>
+                <a:latin typeface="Eurostile" panose="020B0504020202050204" pitchFamily="34" charset="0"/>
               </a:rPr>
               <a:t>(0.08, 0.63, ..., 0.01)</a:t>
             </a:r>
           </a:p>
           <a:p>
             <a:r>
-              <a:rPr lang="fr-FR" b="0" strike="noStrike" spc="-1" dirty="0">
+              <a:rPr lang="fr-FR" b="0" i="1" strike="noStrike" spc="-1" dirty="0">
                 <a:solidFill>
                   <a:srgbClr val="000000"/>
                 </a:solidFill>
@@ -7244,13 +7272,14 @@
                     <a:srgbClr val="FFFFFF"/>
                   </a:solidFill>
                 </a:uFill>
+                <a:latin typeface="Eurostile" panose="020B0504020202050204" pitchFamily="34" charset="0"/>
               </a:rPr>
               <a:t>(-1.36, 1.22, ..., 0.67)</a:t>
             </a:r>
           </a:p>
           <a:p>
             <a:r>
-              <a:rPr lang="fr-FR" b="0" strike="noStrike" spc="-1" dirty="0">
+              <a:rPr lang="fr-FR" b="0" i="1" strike="noStrike" spc="-1" dirty="0">
                 <a:solidFill>
                   <a:srgbClr val="000000"/>
                 </a:solidFill>
@@ -7259,6 +7288,7 @@
                     <a:srgbClr val="FFFFFF"/>
                   </a:solidFill>
                 </a:uFill>
+                <a:latin typeface="Eurostile" panose="020B0504020202050204" pitchFamily="34" charset="0"/>
               </a:rPr>
               <a:t>(2.78, 0.40, ..., 0.57)</a:t>
             </a:r>
@@ -7268,13 +7298,15 @@
       <p:cxnSp>
         <p:nvCxnSpPr>
           <p:cNvPr id="18" name="Connecteur droit 17"/>
-          <p:cNvCxnSpPr/>
+          <p:cNvCxnSpPr>
+            <a:endCxn id="15" idx="2"/>
+          </p:cNvCxnSpPr>
           <p:nvPr/>
         </p:nvCxnSpPr>
         <p:spPr>
           <a:xfrm>
-            <a:off x="6988078" y="4521060"/>
-            <a:ext cx="1131346" cy="0"/>
+            <a:off x="7092280" y="4536540"/>
+            <a:ext cx="863196" cy="0"/>
           </a:xfrm>
           <a:prstGeom prst="line">
             <a:avLst/>
@@ -7303,14 +7335,12 @@
       <p:cxnSp>
         <p:nvCxnSpPr>
           <p:cNvPr id="17" name="Connecteur droit avec flèche 16"/>
-          <p:cNvCxnSpPr>
-            <a:endCxn id="16" idx="0"/>
-          </p:cNvCxnSpPr>
+          <p:cNvCxnSpPr/>
           <p:nvPr/>
         </p:nvCxnSpPr>
         <p:spPr>
           <a:xfrm>
-            <a:off x="8119424" y="4536540"/>
+            <a:off x="7955476" y="4534200"/>
             <a:ext cx="0" cy="620652"/>
           </a:xfrm>
           <a:prstGeom prst="straightConnector1">

</xml_diff>